<commit_message>
Ppt kéesz after login panel log aout gomb
</commit_message>
<xml_diff>
--- a/bemutato/Prezentacio.pptx
+++ b/bemutato/Prezentacio.pptx
@@ -8,12 +8,16 @@
     <p:sldId id="256" r:id="rId2"/>
     <p:sldId id="257" r:id="rId3"/>
     <p:sldId id="261" r:id="rId4"/>
-    <p:sldId id="260" r:id="rId5"/>
-    <p:sldId id="262" r:id="rId6"/>
-    <p:sldId id="263" r:id="rId7"/>
-    <p:sldId id="264" r:id="rId8"/>
-    <p:sldId id="265" r:id="rId9"/>
-    <p:sldId id="266" r:id="rId10"/>
+    <p:sldId id="268" r:id="rId5"/>
+    <p:sldId id="269" r:id="rId6"/>
+    <p:sldId id="260" r:id="rId7"/>
+    <p:sldId id="262" r:id="rId8"/>
+    <p:sldId id="263" r:id="rId9"/>
+    <p:sldId id="264" r:id="rId10"/>
+    <p:sldId id="270" r:id="rId11"/>
+    <p:sldId id="267" r:id="rId12"/>
+    <p:sldId id="271" r:id="rId13"/>
+    <p:sldId id="266" r:id="rId14"/>
   </p:sldIdLst>
   <p:sldSz cx="12192000" cy="6858000"/>
   <p:notesSz cx="6858000" cy="9144000"/>
@@ -1218,7 +1222,7 @@
           </a:lstStyle>
           <a:p>
             <a:r>
-              <a:rPr lang="hu-HU" smtClean="0"/>
+              <a:rPr lang="hu-HU"/>
               <a:t>Mintacím szerkesztése</a:t>
             </a:r>
             <a:endParaRPr lang="en-US" dirty="0"/>
@@ -1292,7 +1296,7 @@
           </a:lstStyle>
           <a:p>
             <a:r>
-              <a:rPr lang="hu-HU" smtClean="0"/>
+              <a:rPr lang="hu-HU"/>
               <a:t>Kattintson ide az alcím mintájának szerkesztéséhez</a:t>
             </a:r>
             <a:endParaRPr lang="en-US" dirty="0"/>
@@ -1332,7 +1336,7 @@
             <a:fld id="{9334D819-9F07-4261-B09B-9E467E5D9002}" type="datetimeFigureOut">
               <a:rPr lang="en-US" dirty="0"/>
               <a:pPr/>
-              <a:t>3/24/2022</a:t>
+              <a:t>4/3/2022</a:t>
             </a:fld>
             <a:endParaRPr lang="en-US" dirty="0"/>
           </a:p>
@@ -1490,7 +1494,7 @@
           <a:lstStyle/>
           <a:p>
             <a:r>
-              <a:rPr lang="hu-HU" smtClean="0"/>
+              <a:rPr lang="hu-HU"/>
               <a:t>Mintacím szerkesztése</a:t>
             </a:r>
             <a:endParaRPr lang="en-US" dirty="0"/>
@@ -1514,35 +1518,35 @@
           <a:p>
             <a:pPr lvl="0"/>
             <a:r>
-              <a:rPr lang="hu-HU" smtClean="0"/>
+              <a:rPr lang="hu-HU"/>
               <a:t>Mintaszöveg szerkesztése</a:t>
             </a:r>
           </a:p>
           <a:p>
             <a:pPr lvl="1"/>
             <a:r>
-              <a:rPr lang="hu-HU" smtClean="0"/>
+              <a:rPr lang="hu-HU"/>
               <a:t>Második szint</a:t>
             </a:r>
           </a:p>
           <a:p>
             <a:pPr lvl="2"/>
             <a:r>
-              <a:rPr lang="hu-HU" smtClean="0"/>
+              <a:rPr lang="hu-HU"/>
               <a:t>Harmadik szint</a:t>
             </a:r>
           </a:p>
           <a:p>
             <a:pPr lvl="3"/>
             <a:r>
-              <a:rPr lang="hu-HU" smtClean="0"/>
+              <a:rPr lang="hu-HU"/>
               <a:t>Negyedik szint</a:t>
             </a:r>
           </a:p>
           <a:p>
             <a:pPr lvl="4"/>
             <a:r>
-              <a:rPr lang="hu-HU" smtClean="0"/>
+              <a:rPr lang="hu-HU"/>
               <a:t>Ötödik szint</a:t>
             </a:r>
             <a:endParaRPr lang="en-US" dirty="0"/>
@@ -1566,7 +1570,7 @@
           <a:p>
             <a:fld id="{9334D819-9F07-4261-B09B-9E467E5D9002}" type="datetimeFigureOut">
               <a:rPr lang="en-US" dirty="0"/>
-              <a:t>3/24/2022</a:t>
+              <a:t>4/3/2022</a:t>
             </a:fld>
             <a:endParaRPr lang="en-US" dirty="0"/>
           </a:p>
@@ -1660,7 +1664,7 @@
           <a:lstStyle/>
           <a:p>
             <a:r>
-              <a:rPr lang="hu-HU" smtClean="0"/>
+              <a:rPr lang="hu-HU"/>
               <a:t>Mintacím szerkesztése</a:t>
             </a:r>
             <a:endParaRPr lang="en-US" dirty="0"/>
@@ -1689,35 +1693,35 @@
           <a:p>
             <a:pPr lvl="0"/>
             <a:r>
-              <a:rPr lang="hu-HU" smtClean="0"/>
+              <a:rPr lang="hu-HU"/>
               <a:t>Mintaszöveg szerkesztése</a:t>
             </a:r>
           </a:p>
           <a:p>
             <a:pPr lvl="1"/>
             <a:r>
-              <a:rPr lang="hu-HU" smtClean="0"/>
+              <a:rPr lang="hu-HU"/>
               <a:t>Második szint</a:t>
             </a:r>
           </a:p>
           <a:p>
             <a:pPr lvl="2"/>
             <a:r>
-              <a:rPr lang="hu-HU" smtClean="0"/>
+              <a:rPr lang="hu-HU"/>
               <a:t>Harmadik szint</a:t>
             </a:r>
           </a:p>
           <a:p>
             <a:pPr lvl="3"/>
             <a:r>
-              <a:rPr lang="hu-HU" smtClean="0"/>
+              <a:rPr lang="hu-HU"/>
               <a:t>Negyedik szint</a:t>
             </a:r>
           </a:p>
           <a:p>
             <a:pPr lvl="4"/>
             <a:r>
-              <a:rPr lang="hu-HU" smtClean="0"/>
+              <a:rPr lang="hu-HU"/>
               <a:t>Ötödik szint</a:t>
             </a:r>
             <a:endParaRPr lang="en-US" dirty="0"/>
@@ -1741,7 +1745,7 @@
           <a:p>
             <a:fld id="{9334D819-9F07-4261-B09B-9E467E5D9002}" type="datetimeFigureOut">
               <a:rPr lang="en-US" dirty="0"/>
-              <a:t>3/24/2022</a:t>
+              <a:t>4/3/2022</a:t>
             </a:fld>
             <a:endParaRPr lang="en-US" dirty="0"/>
           </a:p>
@@ -1830,7 +1834,7 @@
           <a:lstStyle/>
           <a:p>
             <a:r>
-              <a:rPr lang="hu-HU" smtClean="0"/>
+              <a:rPr lang="hu-HU"/>
               <a:t>Mintacím szerkesztése</a:t>
             </a:r>
             <a:endParaRPr lang="en-US" dirty="0"/>
@@ -1854,35 +1858,35 @@
           <a:p>
             <a:pPr lvl="0"/>
             <a:r>
-              <a:rPr lang="hu-HU" smtClean="0"/>
+              <a:rPr lang="hu-HU"/>
               <a:t>Mintaszöveg szerkesztése</a:t>
             </a:r>
           </a:p>
           <a:p>
             <a:pPr lvl="1"/>
             <a:r>
-              <a:rPr lang="hu-HU" smtClean="0"/>
+              <a:rPr lang="hu-HU"/>
               <a:t>Második szint</a:t>
             </a:r>
           </a:p>
           <a:p>
             <a:pPr lvl="2"/>
             <a:r>
-              <a:rPr lang="hu-HU" smtClean="0"/>
+              <a:rPr lang="hu-HU"/>
               <a:t>Harmadik szint</a:t>
             </a:r>
           </a:p>
           <a:p>
             <a:pPr lvl="3"/>
             <a:r>
-              <a:rPr lang="hu-HU" smtClean="0"/>
+              <a:rPr lang="hu-HU"/>
               <a:t>Negyedik szint</a:t>
             </a:r>
           </a:p>
           <a:p>
             <a:pPr lvl="4"/>
             <a:r>
-              <a:rPr lang="hu-HU" smtClean="0"/>
+              <a:rPr lang="hu-HU"/>
               <a:t>Ötödik szint</a:t>
             </a:r>
             <a:endParaRPr lang="en-US" dirty="0"/>
@@ -1906,7 +1910,7 @@
           <a:p>
             <a:fld id="{9334D819-9F07-4261-B09B-9E467E5D9002}" type="datetimeFigureOut">
               <a:rPr lang="en-US" dirty="0"/>
-              <a:t>3/24/2022</a:t>
+              <a:t>4/3/2022</a:t>
             </a:fld>
             <a:endParaRPr lang="en-US" dirty="0"/>
           </a:p>
@@ -2018,7 +2022,7 @@
           </a:lstStyle>
           <a:p>
             <a:r>
-              <a:rPr lang="hu-HU" smtClean="0"/>
+              <a:rPr lang="hu-HU"/>
               <a:t>Mintacím szerkesztése</a:t>
             </a:r>
             <a:endParaRPr lang="en-US" dirty="0"/>
@@ -2141,7 +2145,7 @@
           <a:p>
             <a:pPr lvl="0"/>
             <a:r>
-              <a:rPr lang="hu-HU" smtClean="0"/>
+              <a:rPr lang="hu-HU"/>
               <a:t>Mintaszöveg szerkesztése</a:t>
             </a:r>
           </a:p>
@@ -2178,7 +2182,7 @@
             <a:fld id="{9334D819-9F07-4261-B09B-9E467E5D9002}" type="datetimeFigureOut">
               <a:rPr lang="en-US" dirty="0"/>
               <a:pPr/>
-              <a:t>3/24/2022</a:t>
+              <a:t>4/3/2022</a:t>
             </a:fld>
             <a:endParaRPr lang="en-US" dirty="0"/>
           </a:p>
@@ -3237,7 +3241,7 @@
           <a:lstStyle/>
           <a:p>
             <a:r>
-              <a:rPr lang="hu-HU" smtClean="0"/>
+              <a:rPr lang="hu-HU"/>
               <a:t>Mintacím szerkesztése</a:t>
             </a:r>
             <a:endParaRPr lang="en-US" dirty="0"/>
@@ -3266,35 +3270,35 @@
           <a:p>
             <a:pPr lvl="0"/>
             <a:r>
-              <a:rPr lang="hu-HU" smtClean="0"/>
+              <a:rPr lang="hu-HU"/>
               <a:t>Mintaszöveg szerkesztése</a:t>
             </a:r>
           </a:p>
           <a:p>
             <a:pPr lvl="1"/>
             <a:r>
-              <a:rPr lang="hu-HU" smtClean="0"/>
+              <a:rPr lang="hu-HU"/>
               <a:t>Második szint</a:t>
             </a:r>
           </a:p>
           <a:p>
             <a:pPr lvl="2"/>
             <a:r>
-              <a:rPr lang="hu-HU" smtClean="0"/>
+              <a:rPr lang="hu-HU"/>
               <a:t>Harmadik szint</a:t>
             </a:r>
           </a:p>
           <a:p>
             <a:pPr lvl="3"/>
             <a:r>
-              <a:rPr lang="hu-HU" smtClean="0"/>
+              <a:rPr lang="hu-HU"/>
               <a:t>Negyedik szint</a:t>
             </a:r>
           </a:p>
           <a:p>
             <a:pPr lvl="4"/>
             <a:r>
-              <a:rPr lang="hu-HU" smtClean="0"/>
+              <a:rPr lang="hu-HU"/>
               <a:t>Ötödik szint</a:t>
             </a:r>
             <a:endParaRPr lang="en-US" dirty="0"/>
@@ -3323,35 +3327,35 @@
           <a:p>
             <a:pPr lvl="0"/>
             <a:r>
-              <a:rPr lang="hu-HU" smtClean="0"/>
+              <a:rPr lang="hu-HU"/>
               <a:t>Mintaszöveg szerkesztése</a:t>
             </a:r>
           </a:p>
           <a:p>
             <a:pPr lvl="1"/>
             <a:r>
-              <a:rPr lang="hu-HU" smtClean="0"/>
+              <a:rPr lang="hu-HU"/>
               <a:t>Második szint</a:t>
             </a:r>
           </a:p>
           <a:p>
             <a:pPr lvl="2"/>
             <a:r>
-              <a:rPr lang="hu-HU" smtClean="0"/>
+              <a:rPr lang="hu-HU"/>
               <a:t>Harmadik szint</a:t>
             </a:r>
           </a:p>
           <a:p>
             <a:pPr lvl="3"/>
             <a:r>
-              <a:rPr lang="hu-HU" smtClean="0"/>
+              <a:rPr lang="hu-HU"/>
               <a:t>Negyedik szint</a:t>
             </a:r>
           </a:p>
           <a:p>
             <a:pPr lvl="4"/>
             <a:r>
-              <a:rPr lang="hu-HU" smtClean="0"/>
+              <a:rPr lang="hu-HU"/>
               <a:t>Ötödik szint</a:t>
             </a:r>
             <a:endParaRPr lang="en-US" dirty="0"/>
@@ -3375,7 +3379,7 @@
           <a:p>
             <a:fld id="{9334D819-9F07-4261-B09B-9E467E5D9002}" type="datetimeFigureOut">
               <a:rPr lang="en-US" dirty="0"/>
-              <a:t>3/24/2022</a:t>
+              <a:t>4/3/2022</a:t>
             </a:fld>
             <a:endParaRPr lang="en-US" dirty="0"/>
           </a:p>
@@ -3428,7 +3432,7 @@
   <p:clrMapOvr>
     <a:masterClrMapping/>
   </p:clrMapOvr>
-  <p:extLst mod="1">
+  <p:extLst>
     <p:ext uri="{DCECCB84-F9BA-43D5-87BE-67443E8EF086}">
       <p15:sldGuideLst xmlns:p15="http://schemas.microsoft.com/office/powerpoint/2012/main"/>
     </p:ext>
@@ -3474,7 +3478,7 @@
           <a:lstStyle/>
           <a:p>
             <a:r>
-              <a:rPr lang="hu-HU" smtClean="0"/>
+              <a:rPr lang="hu-HU"/>
               <a:t>Mintacím szerkesztése</a:t>
             </a:r>
             <a:endParaRPr lang="en-US" dirty="0"/>
@@ -3549,7 +3553,7 @@
           <a:p>
             <a:pPr lvl="0"/>
             <a:r>
-              <a:rPr lang="hu-HU" smtClean="0"/>
+              <a:rPr lang="hu-HU"/>
               <a:t>Mintaszöveg szerkesztése</a:t>
             </a:r>
           </a:p>
@@ -3577,35 +3581,35 @@
           <a:p>
             <a:pPr lvl="0"/>
             <a:r>
-              <a:rPr lang="hu-HU" smtClean="0"/>
+              <a:rPr lang="hu-HU"/>
               <a:t>Mintaszöveg szerkesztése</a:t>
             </a:r>
           </a:p>
           <a:p>
             <a:pPr lvl="1"/>
             <a:r>
-              <a:rPr lang="hu-HU" smtClean="0"/>
+              <a:rPr lang="hu-HU"/>
               <a:t>Második szint</a:t>
             </a:r>
           </a:p>
           <a:p>
             <a:pPr lvl="2"/>
             <a:r>
-              <a:rPr lang="hu-HU" smtClean="0"/>
+              <a:rPr lang="hu-HU"/>
               <a:t>Harmadik szint</a:t>
             </a:r>
           </a:p>
           <a:p>
             <a:pPr lvl="3"/>
             <a:r>
-              <a:rPr lang="hu-HU" smtClean="0"/>
+              <a:rPr lang="hu-HU"/>
               <a:t>Negyedik szint</a:t>
             </a:r>
           </a:p>
           <a:p>
             <a:pPr lvl="4"/>
             <a:r>
-              <a:rPr lang="hu-HU" smtClean="0"/>
+              <a:rPr lang="hu-HU"/>
               <a:t>Ötödik szint</a:t>
             </a:r>
             <a:endParaRPr lang="en-US" dirty="0"/>
@@ -3680,7 +3684,7 @@
           <a:p>
             <a:pPr lvl="0"/>
             <a:r>
-              <a:rPr lang="hu-HU" smtClean="0"/>
+              <a:rPr lang="hu-HU"/>
               <a:t>Mintaszöveg szerkesztése</a:t>
             </a:r>
           </a:p>
@@ -3708,35 +3712,35 @@
           <a:p>
             <a:pPr lvl="0"/>
             <a:r>
-              <a:rPr lang="hu-HU" smtClean="0"/>
+              <a:rPr lang="hu-HU"/>
               <a:t>Mintaszöveg szerkesztése</a:t>
             </a:r>
           </a:p>
           <a:p>
             <a:pPr lvl="1"/>
             <a:r>
-              <a:rPr lang="hu-HU" smtClean="0"/>
+              <a:rPr lang="hu-HU"/>
               <a:t>Második szint</a:t>
             </a:r>
           </a:p>
           <a:p>
             <a:pPr lvl="2"/>
             <a:r>
-              <a:rPr lang="hu-HU" smtClean="0"/>
+              <a:rPr lang="hu-HU"/>
               <a:t>Harmadik szint</a:t>
             </a:r>
           </a:p>
           <a:p>
             <a:pPr lvl="3"/>
             <a:r>
-              <a:rPr lang="hu-HU" smtClean="0"/>
+              <a:rPr lang="hu-HU"/>
               <a:t>Negyedik szint</a:t>
             </a:r>
           </a:p>
           <a:p>
             <a:pPr lvl="4"/>
             <a:r>
-              <a:rPr lang="hu-HU" smtClean="0"/>
+              <a:rPr lang="hu-HU"/>
               <a:t>Ötödik szint</a:t>
             </a:r>
             <a:endParaRPr lang="en-US" dirty="0"/>
@@ -3760,7 +3764,7 @@
           <a:p>
             <a:fld id="{9334D819-9F07-4261-B09B-9E467E5D9002}" type="datetimeFigureOut">
               <a:rPr lang="en-US" dirty="0"/>
-              <a:t>3/24/2022</a:t>
+              <a:t>4/3/2022</a:t>
             </a:fld>
             <a:endParaRPr lang="en-US" dirty="0"/>
           </a:p>
@@ -3813,7 +3817,7 @@
   <p:clrMapOvr>
     <a:masterClrMapping/>
   </p:clrMapOvr>
-  <p:extLst mod="1">
+  <p:extLst>
     <p:ext uri="{DCECCB84-F9BA-43D5-87BE-67443E8EF086}">
       <p15:sldGuideLst xmlns:p15="http://schemas.microsoft.com/office/powerpoint/2012/main"/>
     </p:ext>
@@ -3854,7 +3858,7 @@
           <a:lstStyle/>
           <a:p>
             <a:r>
-              <a:rPr lang="hu-HU" smtClean="0"/>
+              <a:rPr lang="hu-HU"/>
               <a:t>Mintacím szerkesztése</a:t>
             </a:r>
             <a:endParaRPr lang="en-US" dirty="0"/>
@@ -3878,7 +3882,7 @@
           <a:p>
             <a:fld id="{9334D819-9F07-4261-B09B-9E467E5D9002}" type="datetimeFigureOut">
               <a:rPr lang="en-US" dirty="0"/>
-              <a:t>3/24/2022</a:t>
+              <a:t>4/3/2022</a:t>
             </a:fld>
             <a:endParaRPr lang="en-US" dirty="0"/>
           </a:p>
@@ -3968,7 +3972,7 @@
           <a:p>
             <a:fld id="{9334D819-9F07-4261-B09B-9E467E5D9002}" type="datetimeFigureOut">
               <a:rPr lang="en-US" dirty="0"/>
-              <a:t>3/24/2022</a:t>
+              <a:t>4/3/2022</a:t>
             </a:fld>
             <a:endParaRPr lang="en-US" dirty="0"/>
           </a:p>
@@ -4537,7 +4541,7 @@
           </a:lstStyle>
           <a:p>
             <a:r>
-              <a:rPr lang="hu-HU" smtClean="0"/>
+              <a:rPr lang="hu-HU"/>
               <a:t>Mintacím szerkesztése</a:t>
             </a:r>
             <a:endParaRPr lang="en-US" dirty="0"/>
@@ -4594,35 +4598,35 @@
           <a:p>
             <a:pPr lvl="0"/>
             <a:r>
-              <a:rPr lang="hu-HU" smtClean="0"/>
+              <a:rPr lang="hu-HU"/>
               <a:t>Mintaszöveg szerkesztése</a:t>
             </a:r>
           </a:p>
           <a:p>
             <a:pPr lvl="1"/>
             <a:r>
-              <a:rPr lang="hu-HU" smtClean="0"/>
+              <a:rPr lang="hu-HU"/>
               <a:t>Második szint</a:t>
             </a:r>
           </a:p>
           <a:p>
             <a:pPr lvl="2"/>
             <a:r>
-              <a:rPr lang="hu-HU" smtClean="0"/>
+              <a:rPr lang="hu-HU"/>
               <a:t>Harmadik szint</a:t>
             </a:r>
           </a:p>
           <a:p>
             <a:pPr lvl="3"/>
             <a:r>
-              <a:rPr lang="hu-HU" smtClean="0"/>
+              <a:rPr lang="hu-HU"/>
               <a:t>Negyedik szint</a:t>
             </a:r>
           </a:p>
           <a:p>
             <a:pPr lvl="4"/>
             <a:r>
-              <a:rPr lang="hu-HU" smtClean="0"/>
+              <a:rPr lang="hu-HU"/>
               <a:t>Ötödik szint</a:t>
             </a:r>
             <a:endParaRPr lang="en-US" dirty="0"/>
@@ -4698,7 +4702,7 @@
           <a:p>
             <a:pPr lvl="0"/>
             <a:r>
-              <a:rPr lang="hu-HU" smtClean="0"/>
+              <a:rPr lang="hu-HU"/>
               <a:t>Mintaszöveg szerkesztése</a:t>
             </a:r>
           </a:p>
@@ -4726,7 +4730,7 @@
           <a:p>
             <a:fld id="{9334D819-9F07-4261-B09B-9E467E5D9002}" type="datetimeFigureOut">
               <a:rPr lang="en-US" dirty="0"/>
-              <a:t>3/24/2022</a:t>
+              <a:t>4/3/2022</a:t>
             </a:fld>
             <a:endParaRPr lang="en-US" dirty="0"/>
           </a:p>
@@ -4827,7 +4831,7 @@
   <p:clrMapOvr>
     <a:masterClrMapping/>
   </p:clrMapOvr>
-  <p:extLst mod="1">
+  <p:extLst>
     <p:ext uri="{DCECCB84-F9BA-43D5-87BE-67443E8EF086}">
       <p15:sldGuideLst xmlns:p15="http://schemas.microsoft.com/office/powerpoint/2012/main">
         <p15:guide id="1" orient="horz" pos="696">
@@ -4916,7 +4920,7 @@
           </a:lstStyle>
           <a:p>
             <a:r>
-              <a:rPr lang="hu-HU" smtClean="0"/>
+              <a:rPr lang="hu-HU"/>
               <a:t>Kép beszúrásához kattintson az ikonra</a:t>
             </a:r>
             <a:endParaRPr lang="en-US" dirty="0"/>
@@ -5457,7 +5461,7 @@
           </a:lstStyle>
           <a:p>
             <a:r>
-              <a:rPr lang="hu-HU" smtClean="0"/>
+              <a:rPr lang="hu-HU"/>
               <a:t>Mintacím szerkesztése</a:t>
             </a:r>
             <a:endParaRPr lang="en-US" dirty="0"/>
@@ -5533,7 +5537,7 @@
           <a:p>
             <a:pPr lvl="0"/>
             <a:r>
-              <a:rPr lang="hu-HU" smtClean="0"/>
+              <a:rPr lang="hu-HU"/>
               <a:t>Mintaszöveg szerkesztése</a:t>
             </a:r>
           </a:p>
@@ -5561,7 +5565,7 @@
           <a:p>
             <a:fld id="{9334D819-9F07-4261-B09B-9E467E5D9002}" type="datetimeFigureOut">
               <a:rPr lang="en-US" dirty="0"/>
-              <a:t>3/24/2022</a:t>
+              <a:t>4/3/2022</a:t>
             </a:fld>
             <a:endParaRPr lang="en-US" dirty="0"/>
           </a:p>
@@ -5678,7 +5682,7 @@
           <a:lstStyle/>
           <a:p>
             <a:r>
-              <a:rPr lang="hu-HU" smtClean="0"/>
+              <a:rPr lang="hu-HU"/>
               <a:t>Mintacím szerkesztése</a:t>
             </a:r>
             <a:endParaRPr lang="en-US" dirty="0"/>
@@ -5712,35 +5716,35 @@
           <a:p>
             <a:pPr lvl="0"/>
             <a:r>
-              <a:rPr lang="hu-HU" smtClean="0"/>
+              <a:rPr lang="hu-HU"/>
               <a:t>Mintaszöveg szerkesztése</a:t>
             </a:r>
           </a:p>
           <a:p>
             <a:pPr lvl="1"/>
             <a:r>
-              <a:rPr lang="hu-HU" smtClean="0"/>
+              <a:rPr lang="hu-HU"/>
               <a:t>Második szint</a:t>
             </a:r>
           </a:p>
           <a:p>
             <a:pPr lvl="2"/>
             <a:r>
-              <a:rPr lang="hu-HU" smtClean="0"/>
+              <a:rPr lang="hu-HU"/>
               <a:t>Harmadik szint</a:t>
             </a:r>
           </a:p>
           <a:p>
             <a:pPr lvl="3"/>
             <a:r>
-              <a:rPr lang="hu-HU" smtClean="0"/>
+              <a:rPr lang="hu-HU"/>
               <a:t>Negyedik szint</a:t>
             </a:r>
           </a:p>
           <a:p>
             <a:pPr lvl="4"/>
             <a:r>
-              <a:rPr lang="hu-HU" smtClean="0"/>
+              <a:rPr lang="hu-HU"/>
               <a:t>Ötödik szint</a:t>
             </a:r>
             <a:endParaRPr lang="en-US" dirty="0"/>
@@ -5784,7 +5788,7 @@
             <a:fld id="{9334D819-9F07-4261-B09B-9E467E5D9002}" type="datetimeFigureOut">
               <a:rPr lang="en-US" dirty="0"/>
               <a:pPr/>
-              <a:t>3/24/2022</a:t>
+              <a:t>4/3/2022</a:t>
             </a:fld>
             <a:endParaRPr lang="en-US" dirty="0"/>
           </a:p>
@@ -6723,7 +6727,7 @@
       </a:lvl9pPr>
     </p:otherStyle>
   </p:txStyles>
-  <p:extLst mod="1">
+  <p:extLst>
     <p:ext uri="{27BBF7A9-308A-43DC-89C8-2F10F3537804}">
       <p15:sldGuideLst xmlns:p15="http://schemas.microsoft.com/office/powerpoint/2012/main">
         <p15:guide id="1" pos="792">
@@ -6795,10 +6799,9 @@
           <a:lstStyle/>
           <a:p>
             <a:r>
-              <a:rPr lang="hu-HU" dirty="0" smtClean="0"/>
-              <a:t>A Sorozatkezelés mesterfoka</a:t>
+              <a:rPr lang="hu-HU" dirty="0"/>
+              <a:t>A Filmkezelés mesterfoka</a:t>
             </a:r>
-            <a:endParaRPr lang="hu-HU" dirty="0"/>
           </a:p>
         </p:txBody>
       </p:sp>
@@ -6832,10 +6835,504 @@
           </a:prstGeom>
         </p:spPr>
       </p:pic>
+      <p:pic>
+        <p:nvPicPr>
+          <p:cNvPr id="5" name="Kép 4">
+            <a:extLst>
+              <a:ext uri="{FF2B5EF4-FFF2-40B4-BE49-F238E27FC236}">
+                <a16:creationId xmlns:a16="http://schemas.microsoft.com/office/drawing/2014/main" id="{90562724-E759-4712-B5C7-10EAF2BA1F9C}"/>
+              </a:ext>
+            </a:extLst>
+          </p:cNvPr>
+          <p:cNvPicPr>
+            <a:picLocks noChangeAspect="1"/>
+          </p:cNvPicPr>
+          <p:nvPr/>
+        </p:nvPicPr>
+        <p:blipFill>
+          <a:blip r:embed="rId3"/>
+          <a:stretch>
+            <a:fillRect/>
+          </a:stretch>
+        </p:blipFill>
+        <p:spPr>
+          <a:xfrm>
+            <a:off x="1181866" y="-307731"/>
+            <a:ext cx="10111730" cy="6858000"/>
+          </a:xfrm>
+          <a:prstGeom prst="rect">
+            <a:avLst/>
+          </a:prstGeom>
+        </p:spPr>
+      </p:pic>
     </p:spTree>
     <p:extLst>
       <p:ext uri="{BB962C8B-B14F-4D97-AF65-F5344CB8AC3E}">
         <p14:creationId xmlns:p14="http://schemas.microsoft.com/office/powerpoint/2010/main" val="756495436"/>
+      </p:ext>
+    </p:extLst>
+  </p:cSld>
+  <p:clrMapOvr>
+    <a:masterClrMapping/>
+  </p:clrMapOvr>
+  <mc:AlternateContent xmlns:mc="http://schemas.openxmlformats.org/markup-compatibility/2006" xmlns:p14="http://schemas.microsoft.com/office/powerpoint/2010/main">
+    <mc:Choice Requires="p14">
+      <p:transition spd="slow" p14:dur="4000">
+        <p14:vortex dir="r"/>
+      </p:transition>
+    </mc:Choice>
+    <mc:Fallback xmlns="">
+      <p:transition spd="slow">
+        <p:fade/>
+      </p:transition>
+    </mc:Fallback>
+  </mc:AlternateContent>
+  <p:timing>
+    <p:tnLst>
+      <p:par>
+        <p:cTn id="1" dur="indefinite" restart="never" nodeType="tmRoot"/>
+      </p:par>
+    </p:tnLst>
+  </p:timing>
+</p:sld>
+</file>
+
+<file path=ppt/slides/slide10.xml><?xml version="1.0" encoding="utf-8"?>
+<p:sld xmlns:a="http://schemas.openxmlformats.org/drawingml/2006/main" xmlns:r="http://schemas.openxmlformats.org/officeDocument/2006/relationships" xmlns:p="http://schemas.openxmlformats.org/presentationml/2006/main">
+  <p:cSld>
+    <p:spTree>
+      <p:nvGrpSpPr>
+        <p:cNvPr id="1" name=""/>
+        <p:cNvGrpSpPr/>
+        <p:nvPr/>
+      </p:nvGrpSpPr>
+      <p:grpSpPr>
+        <a:xfrm>
+          <a:off x="0" y="0"/>
+          <a:ext cx="0" cy="0"/>
+          <a:chOff x="0" y="0"/>
+          <a:chExt cx="0" cy="0"/>
+        </a:xfrm>
+      </p:grpSpPr>
+      <p:sp>
+        <p:nvSpPr>
+          <p:cNvPr id="3" name="Cím 2"/>
+          <p:cNvSpPr>
+            <a:spLocks noGrp="1"/>
+          </p:cNvSpPr>
+          <p:nvPr>
+            <p:ph type="title"/>
+          </p:nvPr>
+        </p:nvSpPr>
+        <p:spPr>
+          <a:xfrm>
+            <a:off x="8425806" y="1063870"/>
+            <a:ext cx="3092117" cy="1196670"/>
+          </a:xfrm>
+        </p:spPr>
+        <p:txBody>
+          <a:bodyPr>
+            <a:noAutofit/>
+          </a:bodyPr>
+          <a:lstStyle/>
+          <a:p>
+            <a:r>
+              <a:rPr lang="hu-HU" sz="3200" dirty="0" smtClean="0"/>
+              <a:t>Jelenleg ahogyan tartunk</a:t>
+            </a:r>
+            <a:endParaRPr lang="hu-HU" sz="3200" dirty="0"/>
+          </a:p>
+        </p:txBody>
+      </p:sp>
+      <p:pic>
+        <p:nvPicPr>
+          <p:cNvPr id="5" name="Kép 4"/>
+          <p:cNvPicPr>
+            <a:picLocks noChangeAspect="1"/>
+          </p:cNvPicPr>
+          <p:nvPr/>
+        </p:nvPicPr>
+        <p:blipFill>
+          <a:blip r:embed="rId2"/>
+          <a:stretch>
+            <a:fillRect/>
+          </a:stretch>
+        </p:blipFill>
+        <p:spPr>
+          <a:xfrm>
+            <a:off x="569497" y="1063870"/>
+            <a:ext cx="6564548" cy="4354122"/>
+          </a:xfrm>
+          <a:prstGeom prst="rect">
+            <a:avLst/>
+          </a:prstGeom>
+        </p:spPr>
+      </p:pic>
+    </p:spTree>
+    <p:extLst>
+      <p:ext uri="{BB962C8B-B14F-4D97-AF65-F5344CB8AC3E}">
+        <p14:creationId xmlns:p14="http://schemas.microsoft.com/office/powerpoint/2010/main" val="4035288686"/>
+      </p:ext>
+    </p:extLst>
+  </p:cSld>
+  <p:clrMapOvr>
+    <a:masterClrMapping/>
+  </p:clrMapOvr>
+  <mc:AlternateContent xmlns:mc="http://schemas.openxmlformats.org/markup-compatibility/2006">
+    <mc:Choice xmlns:p14="http://schemas.microsoft.com/office/powerpoint/2010/main" Requires="p14">
+      <p:transition spd="slow" p14:dur="4000">
+        <p14:vortex dir="r"/>
+      </p:transition>
+    </mc:Choice>
+    <mc:Fallback>
+      <p:transition spd="slow">
+        <p:fade/>
+      </p:transition>
+    </mc:Fallback>
+  </mc:AlternateContent>
+  <p:timing>
+    <p:tnLst>
+      <p:par>
+        <p:cTn id="1" dur="indefinite" restart="never" nodeType="tmRoot"/>
+      </p:par>
+    </p:tnLst>
+  </p:timing>
+</p:sld>
+</file>
+
+<file path=ppt/slides/slide11.xml><?xml version="1.0" encoding="utf-8"?>
+<p:sld xmlns:a="http://schemas.openxmlformats.org/drawingml/2006/main" xmlns:r="http://schemas.openxmlformats.org/officeDocument/2006/relationships" xmlns:p="http://schemas.openxmlformats.org/presentationml/2006/main">
+  <p:cSld>
+    <p:spTree>
+      <p:nvGrpSpPr>
+        <p:cNvPr id="1" name=""/>
+        <p:cNvGrpSpPr/>
+        <p:nvPr/>
+      </p:nvGrpSpPr>
+      <p:grpSpPr>
+        <a:xfrm>
+          <a:off x="0" y="0"/>
+          <a:ext cx="0" cy="0"/>
+          <a:chOff x="0" y="0"/>
+          <a:chExt cx="0" cy="0"/>
+        </a:xfrm>
+      </p:grpSpPr>
+      <p:sp>
+        <p:nvSpPr>
+          <p:cNvPr id="3" name="Cím 2"/>
+          <p:cNvSpPr>
+            <a:spLocks noGrp="1"/>
+          </p:cNvSpPr>
+          <p:nvPr>
+            <p:ph type="title"/>
+          </p:nvPr>
+        </p:nvSpPr>
+        <p:spPr/>
+        <p:txBody>
+          <a:bodyPr/>
+          <a:lstStyle/>
+          <a:p>
+            <a:r>
+              <a:rPr lang="hu-HU" dirty="0" err="1" smtClean="0"/>
+              <a:t>Trello</a:t>
+            </a:r>
+            <a:endParaRPr lang="hu-HU" dirty="0"/>
+          </a:p>
+        </p:txBody>
+      </p:sp>
+      <p:sp>
+        <p:nvSpPr>
+          <p:cNvPr id="4" name="Szöveg helye 3"/>
+          <p:cNvSpPr>
+            <a:spLocks noGrp="1"/>
+          </p:cNvSpPr>
+          <p:nvPr>
+            <p:ph type="body" sz="half" idx="2"/>
+          </p:nvPr>
+        </p:nvSpPr>
+        <p:spPr/>
+        <p:txBody>
+          <a:bodyPr>
+            <a:normAutofit/>
+          </a:bodyPr>
+          <a:lstStyle/>
+          <a:p>
+            <a:r>
+              <a:rPr lang="hu-HU" sz="2400" dirty="0" smtClean="0"/>
+              <a:t>Mint látható a </a:t>
+            </a:r>
+            <a:r>
+              <a:rPr lang="hu-HU" sz="2400" dirty="0" err="1" smtClean="0"/>
+              <a:t>trello</a:t>
+            </a:r>
+            <a:r>
+              <a:rPr lang="hu-HU" sz="2400" dirty="0" smtClean="0"/>
+              <a:t> táblát aktívan használjuk, mindenkinek megvan a saját feladata illetve a közös a feladatok.</a:t>
+            </a:r>
+            <a:endParaRPr lang="hu-HU" sz="2400" dirty="0"/>
+          </a:p>
+        </p:txBody>
+      </p:sp>
+      <p:sp>
+        <p:nvSpPr>
+          <p:cNvPr id="7" name="Kép helye 6"/>
+          <p:cNvSpPr>
+            <a:spLocks noGrp="1"/>
+          </p:cNvSpPr>
+          <p:nvPr>
+            <p:ph type="pic" idx="1"/>
+          </p:nvPr>
+        </p:nvSpPr>
+        <p:spPr/>
+      </p:sp>
+      <p:pic>
+        <p:nvPicPr>
+          <p:cNvPr id="8" name="Kép 7"/>
+          <p:cNvPicPr>
+            <a:picLocks noChangeAspect="1"/>
+          </p:cNvPicPr>
+          <p:nvPr/>
+        </p:nvPicPr>
+        <p:blipFill>
+          <a:blip r:embed="rId2"/>
+          <a:stretch>
+            <a:fillRect/>
+          </a:stretch>
+        </p:blipFill>
+        <p:spPr>
+          <a:xfrm>
+            <a:off x="413073" y="1433147"/>
+            <a:ext cx="6878426" cy="3869114"/>
+          </a:xfrm>
+          <a:prstGeom prst="rect">
+            <a:avLst/>
+          </a:prstGeom>
+        </p:spPr>
+      </p:pic>
+    </p:spTree>
+    <p:extLst>
+      <p:ext uri="{BB962C8B-B14F-4D97-AF65-F5344CB8AC3E}">
+        <p14:creationId xmlns:p14="http://schemas.microsoft.com/office/powerpoint/2010/main" val="197211558"/>
+      </p:ext>
+    </p:extLst>
+  </p:cSld>
+  <p:clrMapOvr>
+    <a:masterClrMapping/>
+  </p:clrMapOvr>
+  <mc:AlternateContent xmlns:mc="http://schemas.openxmlformats.org/markup-compatibility/2006" xmlns:p14="http://schemas.microsoft.com/office/powerpoint/2010/main">
+    <mc:Choice Requires="p14">
+      <p:transition spd="slow" p14:dur="4000">
+        <p14:vortex dir="r"/>
+      </p:transition>
+    </mc:Choice>
+    <mc:Fallback xmlns="">
+      <p:transition spd="slow">
+        <p:fade/>
+      </p:transition>
+    </mc:Fallback>
+  </mc:AlternateContent>
+  <p:timing>
+    <p:tnLst>
+      <p:par>
+        <p:cTn id="1" dur="indefinite" restart="never" nodeType="tmRoot"/>
+      </p:par>
+    </p:tnLst>
+  </p:timing>
+</p:sld>
+</file>
+
+<file path=ppt/slides/slide12.xml><?xml version="1.0" encoding="utf-8"?>
+<p:sld xmlns:a="http://schemas.openxmlformats.org/drawingml/2006/main" xmlns:r="http://schemas.openxmlformats.org/officeDocument/2006/relationships" xmlns:p="http://schemas.openxmlformats.org/presentationml/2006/main">
+  <p:cSld>
+    <p:spTree>
+      <p:nvGrpSpPr>
+        <p:cNvPr id="1" name=""/>
+        <p:cNvGrpSpPr/>
+        <p:nvPr/>
+      </p:nvGrpSpPr>
+      <p:grpSpPr>
+        <a:xfrm>
+          <a:off x="0" y="0"/>
+          <a:ext cx="0" cy="0"/>
+          <a:chOff x="0" y="0"/>
+          <a:chExt cx="0" cy="0"/>
+        </a:xfrm>
+      </p:grpSpPr>
+      <p:sp>
+        <p:nvSpPr>
+          <p:cNvPr id="3" name="Cím 2"/>
+          <p:cNvSpPr>
+            <a:spLocks noGrp="1"/>
+          </p:cNvSpPr>
+          <p:nvPr>
+            <p:ph type="title"/>
+          </p:nvPr>
+        </p:nvSpPr>
+        <p:spPr/>
+        <p:txBody>
+          <a:bodyPr>
+            <a:normAutofit/>
+          </a:bodyPr>
+          <a:lstStyle/>
+          <a:p>
+            <a:r>
+              <a:rPr lang="hu-HU" sz="3600" dirty="0" err="1" smtClean="0"/>
+              <a:t>Git</a:t>
+            </a:r>
+            <a:r>
+              <a:rPr lang="hu-HU" sz="3600" dirty="0" smtClean="0"/>
+              <a:t> </a:t>
+            </a:r>
+            <a:r>
+              <a:rPr lang="hu-HU" sz="3600" dirty="0" err="1" smtClean="0"/>
+              <a:t>Hub</a:t>
+            </a:r>
+            <a:endParaRPr lang="hu-HU" sz="3600" dirty="0"/>
+          </a:p>
+        </p:txBody>
+      </p:sp>
+      <p:sp>
+        <p:nvSpPr>
+          <p:cNvPr id="4" name="Szöveg helye 3"/>
+          <p:cNvSpPr>
+            <a:spLocks noGrp="1"/>
+          </p:cNvSpPr>
+          <p:nvPr>
+            <p:ph type="body" sz="half" idx="2"/>
+          </p:nvPr>
+        </p:nvSpPr>
+        <p:spPr/>
+        <p:txBody>
+          <a:bodyPr/>
+          <a:lstStyle/>
+          <a:p>
+            <a:endParaRPr lang="hu-HU"/>
+          </a:p>
+        </p:txBody>
+      </p:sp>
+      <p:pic>
+        <p:nvPicPr>
+          <p:cNvPr id="5" name="Kép 4"/>
+          <p:cNvPicPr>
+            <a:picLocks noChangeAspect="1"/>
+          </p:cNvPicPr>
+          <p:nvPr/>
+        </p:nvPicPr>
+        <p:blipFill>
+          <a:blip r:embed="rId2"/>
+          <a:stretch>
+            <a:fillRect/>
+          </a:stretch>
+        </p:blipFill>
+        <p:spPr>
+          <a:xfrm>
+            <a:off x="706783" y="3823418"/>
+            <a:ext cx="6323665" cy="2207151"/>
+          </a:xfrm>
+          <a:prstGeom prst="rect">
+            <a:avLst/>
+          </a:prstGeom>
+        </p:spPr>
+      </p:pic>
+      <p:pic>
+        <p:nvPicPr>
+          <p:cNvPr id="6" name="Kép 5"/>
+          <p:cNvPicPr>
+            <a:picLocks noChangeAspect="1"/>
+          </p:cNvPicPr>
+          <p:nvPr/>
+        </p:nvPicPr>
+        <p:blipFill>
+          <a:blip r:embed="rId3"/>
+          <a:stretch>
+            <a:fillRect/>
+          </a:stretch>
+        </p:blipFill>
+        <p:spPr>
+          <a:xfrm>
+            <a:off x="422031" y="1121628"/>
+            <a:ext cx="6893170" cy="2369341"/>
+          </a:xfrm>
+          <a:prstGeom prst="rect">
+            <a:avLst/>
+          </a:prstGeom>
+        </p:spPr>
+      </p:pic>
+    </p:spTree>
+    <p:extLst>
+      <p:ext uri="{BB962C8B-B14F-4D97-AF65-F5344CB8AC3E}">
+        <p14:creationId xmlns:p14="http://schemas.microsoft.com/office/powerpoint/2010/main" val="3120614190"/>
+      </p:ext>
+    </p:extLst>
+  </p:cSld>
+  <p:clrMapOvr>
+    <a:masterClrMapping/>
+  </p:clrMapOvr>
+  <mc:AlternateContent xmlns:mc="http://schemas.openxmlformats.org/markup-compatibility/2006">
+    <mc:Choice xmlns:p14="http://schemas.microsoft.com/office/powerpoint/2010/main" Requires="p14">
+      <p:transition spd="slow" p14:dur="4000">
+        <p14:vortex dir="r"/>
+      </p:transition>
+    </mc:Choice>
+    <mc:Fallback>
+      <p:transition spd="slow">
+        <p:fade/>
+      </p:transition>
+    </mc:Fallback>
+  </mc:AlternateContent>
+  <p:timing>
+    <p:tnLst>
+      <p:par>
+        <p:cTn id="1" dur="indefinite" restart="never" nodeType="tmRoot"/>
+      </p:par>
+    </p:tnLst>
+  </p:timing>
+</p:sld>
+</file>
+
+<file path=ppt/slides/slide13.xml><?xml version="1.0" encoding="utf-8"?>
+<p:sld xmlns:a="http://schemas.openxmlformats.org/drawingml/2006/main" xmlns:r="http://schemas.openxmlformats.org/officeDocument/2006/relationships" xmlns:p="http://schemas.openxmlformats.org/presentationml/2006/main">
+  <p:cSld>
+    <p:spTree>
+      <p:nvGrpSpPr>
+        <p:cNvPr id="1" name=""/>
+        <p:cNvGrpSpPr/>
+        <p:nvPr/>
+      </p:nvGrpSpPr>
+      <p:grpSpPr>
+        <a:xfrm>
+          <a:off x="0" y="0"/>
+          <a:ext cx="0" cy="0"/>
+          <a:chOff x="0" y="0"/>
+          <a:chExt cx="0" cy="0"/>
+        </a:xfrm>
+      </p:grpSpPr>
+      <p:sp>
+        <p:nvSpPr>
+          <p:cNvPr id="2" name="Cím 1"/>
+          <p:cNvSpPr>
+            <a:spLocks noGrp="1"/>
+          </p:cNvSpPr>
+          <p:nvPr>
+            <p:ph type="ctrTitle"/>
+          </p:nvPr>
+        </p:nvSpPr>
+        <p:spPr/>
+        <p:txBody>
+          <a:bodyPr/>
+          <a:lstStyle/>
+          <a:p>
+            <a:r>
+              <a:rPr lang="hu-HU" dirty="0"/>
+              <a:t>Köszönöm a figyelmet</a:t>
+            </a:r>
+          </a:p>
+        </p:txBody>
+      </p:sp>
+    </p:spTree>
+    <p:extLst>
+      <p:ext uri="{BB962C8B-B14F-4D97-AF65-F5344CB8AC3E}">
+        <p14:creationId xmlns:p14="http://schemas.microsoft.com/office/powerpoint/2010/main" val="3241144433"/>
       </p:ext>
     </p:extLst>
   </p:cSld>
@@ -6902,10 +7399,9 @@
           <a:lstStyle/>
           <a:p>
             <a:r>
-              <a:rPr lang="hu-HU" dirty="0" smtClean="0"/>
+              <a:rPr lang="hu-HU" dirty="0"/>
               <a:t>Munkafelosztás:</a:t>
             </a:r>
-            <a:endParaRPr lang="hu-HU" dirty="0"/>
           </a:p>
         </p:txBody>
       </p:sp>
@@ -6966,7 +7462,7 @@
               <a:buChar char="•"/>
             </a:pPr>
             <a:r>
-              <a:rPr lang="hu-HU" sz="4000" b="1" dirty="0" smtClean="0">
+              <a:rPr lang="hu-HU" sz="4000" b="1" dirty="0">
                 <a:latin typeface="Arial Rounded MT Bold" panose="020F0704030504030204" pitchFamily="34" charset="0"/>
               </a:rPr>
               <a:t>Jakab Szabolcs (Back End)</a:t>
@@ -6978,7 +7474,7 @@
               <a:buChar char="•"/>
             </a:pPr>
             <a:r>
-              <a:rPr lang="hu-HU" sz="4000" b="1" dirty="0" smtClean="0">
+              <a:rPr lang="hu-HU" sz="4000" b="1" dirty="0">
                 <a:latin typeface="Arial Rounded MT Bold" panose="020F0704030504030204" pitchFamily="34" charset="0"/>
               </a:rPr>
               <a:t>Szabó Zsolt(Back End)</a:t>
@@ -6990,7 +7486,7 @@
               <a:buChar char="•"/>
             </a:pPr>
             <a:r>
-              <a:rPr lang="hu-HU" sz="4000" b="1" dirty="0" smtClean="0">
+              <a:rPr lang="hu-HU" sz="4000" b="1" dirty="0">
                 <a:latin typeface="Arial Rounded MT Bold" panose="020F0704030504030204" pitchFamily="34" charset="0"/>
               </a:rPr>
               <a:t>Szücs Tamás(Front End, Unit test)</a:t>
@@ -7002,14 +7498,11 @@
               <a:buChar char="•"/>
             </a:pPr>
             <a:r>
-              <a:rPr lang="hu-HU" sz="4000" b="1" dirty="0" smtClean="0">
+              <a:rPr lang="hu-HU" sz="4000" b="1" dirty="0">
                 <a:latin typeface="Arial Rounded MT Bold" panose="020F0704030504030204" pitchFamily="34" charset="0"/>
               </a:rPr>
               <a:t>Kovács Zoltán(Front End, Unit test)</a:t>
             </a:r>
-            <a:endParaRPr lang="hu-HU" sz="4000" b="1" dirty="0">
-              <a:latin typeface="Arial Rounded MT Bold" panose="020F0704030504030204" pitchFamily="34" charset="0"/>
-            </a:endParaRPr>
           </a:p>
         </p:txBody>
       </p:sp>
@@ -7127,6 +7620,36 @@
           <a:xfrm>
             <a:off x="4134237" y="4340235"/>
             <a:ext cx="1227754" cy="2183766"/>
+          </a:xfrm>
+          <a:prstGeom prst="rect">
+            <a:avLst/>
+          </a:prstGeom>
+        </p:spPr>
+      </p:pic>
+      <p:pic>
+        <p:nvPicPr>
+          <p:cNvPr id="10" name="Kép 9">
+            <a:extLst>
+              <a:ext uri="{FF2B5EF4-FFF2-40B4-BE49-F238E27FC236}">
+                <a16:creationId xmlns:a16="http://schemas.microsoft.com/office/drawing/2014/main" id="{E286C1D7-C107-43AC-9727-1AA45B0C2460}"/>
+              </a:ext>
+            </a:extLst>
+          </p:cNvPr>
+          <p:cNvPicPr>
+            <a:picLocks noChangeAspect="1"/>
+          </p:cNvPicPr>
+          <p:nvPr/>
+        </p:nvPicPr>
+        <p:blipFill>
+          <a:blip r:embed="rId7"/>
+          <a:stretch>
+            <a:fillRect/>
+          </a:stretch>
+        </p:blipFill>
+        <p:spPr>
+          <a:xfrm>
+            <a:off x="9948418" y="-14960"/>
+            <a:ext cx="2265640" cy="1536606"/>
           </a:xfrm>
           <a:prstGeom prst="rect">
             <a:avLst/>
@@ -8019,8 +8542,16 @@
           <a:lstStyle/>
           <a:p>
             <a:r>
+              <a:rPr lang="hu-HU" dirty="0"/>
+              <a:t>Na de mi is a </a:t>
+            </a:r>
+            <a:r>
+              <a:rPr lang="hu-HU" dirty="0" err="1" smtClean="0"/>
+              <a:t>Movie</a:t>
+            </a:r>
+            <a:r>
               <a:rPr lang="hu-HU" dirty="0" smtClean="0"/>
-              <a:t>Na de mi is a sori!?</a:t>
+              <a:t>!?</a:t>
             </a:r>
             <a:endParaRPr lang="hu-HU" dirty="0"/>
           </a:p>
@@ -8080,6 +8611,36 @@
           <a:xfrm>
             <a:off x="2273767" y="1506686"/>
             <a:ext cx="8134143" cy="4882002"/>
+          </a:xfrm>
+          <a:prstGeom prst="rect">
+            <a:avLst/>
+          </a:prstGeom>
+        </p:spPr>
+      </p:pic>
+      <p:pic>
+        <p:nvPicPr>
+          <p:cNvPr id="5" name="Kép 4">
+            <a:extLst>
+              <a:ext uri="{FF2B5EF4-FFF2-40B4-BE49-F238E27FC236}">
+                <a16:creationId xmlns:a16="http://schemas.microsoft.com/office/drawing/2014/main" id="{323539D9-F6CD-432A-950E-CABD11DB70C1}"/>
+              </a:ext>
+            </a:extLst>
+          </p:cNvPr>
+          <p:cNvPicPr>
+            <a:picLocks noChangeAspect="1"/>
+          </p:cNvPicPr>
+          <p:nvPr/>
+        </p:nvPicPr>
+        <p:blipFill>
+          <a:blip r:embed="rId4"/>
+          <a:stretch>
+            <a:fillRect/>
+          </a:stretch>
+        </p:blipFill>
+        <p:spPr>
+          <a:xfrm>
+            <a:off x="9948418" y="-14960"/>
+            <a:ext cx="2265640" cy="1536606"/>
           </a:xfrm>
           <a:prstGeom prst="rect">
             <a:avLst/>
@@ -8541,36 +9102,18 @@
           <a:chExt cx="0" cy="0"/>
         </a:xfrm>
       </p:grpSpPr>
-      <p:pic>
-        <p:nvPicPr>
-          <p:cNvPr id="5" name="Kép 4"/>
-          <p:cNvPicPr>
-            <a:picLocks noChangeAspect="1"/>
-          </p:cNvPicPr>
-          <p:nvPr/>
-        </p:nvPicPr>
-        <p:blipFill>
-          <a:blip r:embed="rId2">
-            <a:extLst>
-              <a:ext uri="{28A0092B-C50C-407E-A947-70E740481C1C}">
-                <a14:useLocalDpi xmlns:a14="http://schemas.microsoft.com/office/drawing/2010/main" val="0"/>
-              </a:ext>
-            </a:extLst>
-          </a:blip>
-          <a:stretch>
-            <a:fillRect/>
-          </a:stretch>
-        </p:blipFill>
-        <p:spPr>
-          <a:xfrm>
-            <a:off x="9970476" y="0"/>
-            <a:ext cx="2221524" cy="1506686"/>
-          </a:xfrm>
-          <a:prstGeom prst="rect">
-            <a:avLst/>
-          </a:prstGeom>
-        </p:spPr>
-      </p:pic>
+      <p:sp>
+        <p:nvSpPr>
+          <p:cNvPr id="2" name="Kép helye 1"/>
+          <p:cNvSpPr>
+            <a:spLocks noGrp="1"/>
+          </p:cNvSpPr>
+          <p:nvPr>
+            <p:ph type="pic" idx="1"/>
+          </p:nvPr>
+        </p:nvSpPr>
+        <p:spPr/>
+      </p:sp>
       <p:sp>
         <p:nvSpPr>
           <p:cNvPr id="3" name="Cím 2"/>
@@ -8581,19 +9124,14 @@
             <p:ph type="title"/>
           </p:nvPr>
         </p:nvSpPr>
-        <p:spPr>
-          <a:xfrm>
-            <a:off x="7713628" y="1216081"/>
-            <a:ext cx="3092116" cy="581209"/>
-          </a:xfrm>
-        </p:spPr>
+        <p:spPr/>
         <p:txBody>
           <a:bodyPr/>
           <a:lstStyle/>
           <a:p>
             <a:r>
               <a:rPr lang="hu-HU" dirty="0" smtClean="0"/>
-              <a:t>A követés fül</a:t>
+              <a:t>Minta a táblákhoz</a:t>
             </a:r>
             <a:endParaRPr lang="hu-HU" dirty="0"/>
           </a:p>
@@ -8609,54 +9147,33 @@
             <p:ph type="body" sz="half" idx="2"/>
           </p:nvPr>
         </p:nvSpPr>
-        <p:spPr>
-          <a:xfrm>
-            <a:off x="7819136" y="1943559"/>
-            <a:ext cx="3092117" cy="4164164"/>
-          </a:xfrm>
-        </p:spPr>
+        <p:spPr/>
         <p:txBody>
-          <a:bodyPr>
-            <a:normAutofit/>
-          </a:bodyPr>
+          <a:bodyPr/>
           <a:lstStyle/>
           <a:p>
-            <a:r>
-              <a:rPr lang="hu-HU" sz="3200" dirty="0" smtClean="0"/>
-              <a:t>Itt követhetjük nyomon a sorozatainkat</a:t>
-            </a:r>
-            <a:r>
-              <a:rPr lang="hu-HU" sz="3200" dirty="0" smtClean="0"/>
-              <a:t>, a címet, a részek és azoknak a hosszát.</a:t>
-            </a:r>
-            <a:endParaRPr lang="hu-HU" sz="3200" dirty="0"/>
+            <a:endParaRPr lang="hu-HU" dirty="0"/>
           </a:p>
         </p:txBody>
       </p:sp>
       <p:pic>
         <p:nvPicPr>
-          <p:cNvPr id="10" name="Kép 9"/>
+          <p:cNvPr id="5" name="Kép 4"/>
           <p:cNvPicPr>
             <a:picLocks noChangeAspect="1"/>
           </p:cNvPicPr>
           <p:nvPr/>
         </p:nvPicPr>
         <p:blipFill>
-          <a:blip r:embed="rId3">
-            <a:extLst>
-              <a:ext uri="{28A0092B-C50C-407E-A947-70E740481C1C}">
-                <a14:useLocalDpi xmlns:a14="http://schemas.microsoft.com/office/drawing/2010/main" val="0"/>
-              </a:ext>
-            </a:extLst>
-          </a:blip>
+          <a:blip r:embed="rId2"/>
           <a:stretch>
             <a:fillRect/>
           </a:stretch>
         </p:blipFill>
         <p:spPr>
           <a:xfrm>
-            <a:off x="290146" y="1471975"/>
-            <a:ext cx="7065108" cy="3974123"/>
+            <a:off x="512916" y="1493617"/>
+            <a:ext cx="6896680" cy="2875605"/>
           </a:xfrm>
           <a:prstGeom prst="rect">
             <a:avLst/>
@@ -8666,20 +9183,20 @@
     </p:spTree>
     <p:extLst>
       <p:ext uri="{BB962C8B-B14F-4D97-AF65-F5344CB8AC3E}">
-        <p14:creationId xmlns:p14="http://schemas.microsoft.com/office/powerpoint/2010/main" val="2986308909"/>
+        <p14:creationId xmlns:p14="http://schemas.microsoft.com/office/powerpoint/2010/main" val="3609199470"/>
       </p:ext>
     </p:extLst>
   </p:cSld>
   <p:clrMapOvr>
     <a:masterClrMapping/>
   </p:clrMapOvr>
-  <mc:AlternateContent xmlns:mc="http://schemas.openxmlformats.org/markup-compatibility/2006" xmlns:p14="http://schemas.microsoft.com/office/powerpoint/2010/main">
-    <mc:Choice Requires="p14">
+  <mc:AlternateContent xmlns:mc="http://schemas.openxmlformats.org/markup-compatibility/2006">
+    <mc:Choice xmlns:p14="http://schemas.microsoft.com/office/powerpoint/2010/main" Requires="p14">
       <p:transition spd="slow" p14:dur="4000">
         <p14:vortex dir="r"/>
       </p:transition>
     </mc:Choice>
-    <mc:Fallback xmlns="">
+    <mc:Fallback>
       <p:transition spd="slow">
         <p:fade/>
       </p:transition>
@@ -8712,36 +9229,6 @@
           <a:chExt cx="0" cy="0"/>
         </a:xfrm>
       </p:grpSpPr>
-      <p:pic>
-        <p:nvPicPr>
-          <p:cNvPr id="5" name="Kép 4"/>
-          <p:cNvPicPr>
-            <a:picLocks noChangeAspect="1"/>
-          </p:cNvPicPr>
-          <p:nvPr/>
-        </p:nvPicPr>
-        <p:blipFill>
-          <a:blip r:embed="rId2">
-            <a:extLst>
-              <a:ext uri="{28A0092B-C50C-407E-A947-70E740481C1C}">
-                <a14:useLocalDpi xmlns:a14="http://schemas.microsoft.com/office/drawing/2010/main" val="0"/>
-              </a:ext>
-            </a:extLst>
-          </a:blip>
-          <a:stretch>
-            <a:fillRect/>
-          </a:stretch>
-        </p:blipFill>
-        <p:spPr>
-          <a:xfrm>
-            <a:off x="9970476" y="0"/>
-            <a:ext cx="2221524" cy="1506686"/>
-          </a:xfrm>
-          <a:prstGeom prst="rect">
-            <a:avLst/>
-          </a:prstGeom>
-        </p:spPr>
-      </p:pic>
       <p:sp>
         <p:nvSpPr>
           <p:cNvPr id="3" name="Cím 2"/>
@@ -8752,19 +9239,14 @@
             <p:ph type="title"/>
           </p:nvPr>
         </p:nvSpPr>
-        <p:spPr>
-          <a:xfrm>
-            <a:off x="7713628" y="1216081"/>
-            <a:ext cx="3092116" cy="581209"/>
-          </a:xfrm>
-        </p:spPr>
+        <p:spPr/>
         <p:txBody>
           <a:bodyPr/>
           <a:lstStyle/>
           <a:p>
             <a:r>
               <a:rPr lang="hu-HU" dirty="0" smtClean="0"/>
-              <a:t>A keresés fül</a:t>
+              <a:t>Login panel</a:t>
             </a:r>
             <a:endParaRPr lang="hu-HU" dirty="0"/>
           </a:p>
@@ -8780,50 +9262,33 @@
             <p:ph type="body" sz="half" idx="2"/>
           </p:nvPr>
         </p:nvSpPr>
-        <p:spPr>
-          <a:xfrm>
-            <a:off x="7713628" y="2295251"/>
-            <a:ext cx="3092117" cy="4164164"/>
-          </a:xfrm>
-        </p:spPr>
+        <p:spPr/>
         <p:txBody>
-          <a:bodyPr>
-            <a:normAutofit/>
-          </a:bodyPr>
+          <a:bodyPr/>
           <a:lstStyle/>
           <a:p>
-            <a:r>
-              <a:rPr lang="hu-HU" sz="3200" dirty="0" smtClean="0"/>
-              <a:t>Itt kereshetjük ki az adatbázisból a kívánt sorozatot.</a:t>
-            </a:r>
-            <a:endParaRPr lang="hu-HU" sz="3200" dirty="0"/>
+            <a:endParaRPr lang="hu-HU" dirty="0"/>
           </a:p>
         </p:txBody>
       </p:sp>
       <p:pic>
         <p:nvPicPr>
-          <p:cNvPr id="2" name="Kép 1"/>
+          <p:cNvPr id="5" name="Kép 4"/>
           <p:cNvPicPr>
             <a:picLocks noChangeAspect="1"/>
           </p:cNvPicPr>
           <p:nvPr/>
         </p:nvPicPr>
         <p:blipFill>
-          <a:blip r:embed="rId3">
-            <a:extLst>
-              <a:ext uri="{28A0092B-C50C-407E-A947-70E740481C1C}">
-                <a14:useLocalDpi xmlns:a14="http://schemas.microsoft.com/office/drawing/2010/main" val="0"/>
-              </a:ext>
-            </a:extLst>
-          </a:blip>
+          <a:blip r:embed="rId2"/>
           <a:stretch>
             <a:fillRect/>
           </a:stretch>
         </p:blipFill>
         <p:spPr>
           <a:xfrm>
-            <a:off x="290147" y="1506686"/>
-            <a:ext cx="6989884" cy="3931810"/>
+            <a:off x="413238" y="652836"/>
+            <a:ext cx="6823370" cy="4868616"/>
           </a:xfrm>
           <a:prstGeom prst="rect">
             <a:avLst/>
@@ -8833,20 +9298,20 @@
     </p:spTree>
     <p:extLst>
       <p:ext uri="{BB962C8B-B14F-4D97-AF65-F5344CB8AC3E}">
-        <p14:creationId xmlns:p14="http://schemas.microsoft.com/office/powerpoint/2010/main" val="3577813126"/>
+        <p14:creationId xmlns:p14="http://schemas.microsoft.com/office/powerpoint/2010/main" val="989361654"/>
       </p:ext>
     </p:extLst>
   </p:cSld>
   <p:clrMapOvr>
     <a:masterClrMapping/>
   </p:clrMapOvr>
-  <mc:AlternateContent xmlns:mc="http://schemas.openxmlformats.org/markup-compatibility/2006" xmlns:p14="http://schemas.microsoft.com/office/powerpoint/2010/main">
-    <mc:Choice Requires="p14">
+  <mc:AlternateContent xmlns:mc="http://schemas.openxmlformats.org/markup-compatibility/2006">
+    <mc:Choice xmlns:p14="http://schemas.microsoft.com/office/powerpoint/2010/main" Requires="p14">
       <p:transition spd="slow" p14:dur="4000">
         <p14:vortex dir="r"/>
       </p:transition>
     </mc:Choice>
-    <mc:Fallback xmlns="">
+    <mc:Fallback>
       <p:transition spd="slow">
         <p:fade/>
       </p:transition>
@@ -8926,16 +9391,13 @@
           </a:xfrm>
         </p:spPr>
         <p:txBody>
-          <a:bodyPr>
-            <a:normAutofit fontScale="90000"/>
-          </a:bodyPr>
+          <a:bodyPr/>
           <a:lstStyle/>
           <a:p>
             <a:r>
-              <a:rPr lang="hu-HU" dirty="0" smtClean="0"/>
-              <a:t>A hozzáadás fül</a:t>
+              <a:rPr lang="hu-HU" dirty="0"/>
+              <a:t>A követés fül</a:t>
             </a:r>
-            <a:endParaRPr lang="hu-HU" dirty="0"/>
           </a:p>
         </p:txBody>
       </p:sp>
@@ -8951,29 +9413,37 @@
         </p:nvSpPr>
         <p:spPr>
           <a:xfrm>
-            <a:off x="7713628" y="2295251"/>
+            <a:off x="7819136" y="1943559"/>
             <a:ext cx="3092117" cy="4164164"/>
           </a:xfrm>
         </p:spPr>
         <p:txBody>
           <a:bodyPr>
-            <a:normAutofit/>
+            <a:normAutofit lnSpcReduction="10000"/>
           </a:bodyPr>
           <a:lstStyle/>
           <a:p>
             <a:r>
+              <a:rPr lang="hu-HU" sz="3200" dirty="0"/>
+              <a:t>Itt követhetjük nyomon a </a:t>
+            </a:r>
+            <a:r>
               <a:rPr lang="hu-HU" sz="3200" dirty="0" smtClean="0"/>
-              <a:t>Itt adhatunk hozzá az adatbázisunkhoz új sorozatot.</a:t>
+              <a:t>filmjeinket és azoknak a hosszát.</a:t>
             </a:r>
           </a:p>
           <a:p>
+            <a:r>
+              <a:rPr lang="hu-HU" sz="3200" dirty="0" smtClean="0"/>
+              <a:t>És hozza egy rövid leírást.</a:t>
+            </a:r>
             <a:endParaRPr lang="hu-HU" sz="3200" dirty="0"/>
           </a:p>
         </p:txBody>
       </p:sp>
       <p:pic>
         <p:nvPicPr>
-          <p:cNvPr id="6" name="Kép 5"/>
+          <p:cNvPr id="10" name="Kép 9"/>
           <p:cNvPicPr>
             <a:picLocks noChangeAspect="1"/>
           </p:cNvPicPr>
@@ -8993,8 +9463,68 @@
         </p:blipFill>
         <p:spPr>
           <a:xfrm>
-            <a:off x="272562" y="1608992"/>
-            <a:ext cx="6971324" cy="3921370"/>
+            <a:off x="290146" y="1471975"/>
+            <a:ext cx="7065108" cy="3974123"/>
+          </a:xfrm>
+          <a:prstGeom prst="rect">
+            <a:avLst/>
+          </a:prstGeom>
+        </p:spPr>
+      </p:pic>
+      <p:pic>
+        <p:nvPicPr>
+          <p:cNvPr id="6" name="Kép 5">
+            <a:extLst>
+              <a:ext uri="{FF2B5EF4-FFF2-40B4-BE49-F238E27FC236}">
+                <a16:creationId xmlns:a16="http://schemas.microsoft.com/office/drawing/2014/main" id="{1DF74B70-BE41-4FFA-9FE0-B788B12DA8D7}"/>
+              </a:ext>
+            </a:extLst>
+          </p:cNvPr>
+          <p:cNvPicPr>
+            <a:picLocks noChangeAspect="1"/>
+          </p:cNvPicPr>
+          <p:nvPr/>
+        </p:nvPicPr>
+        <p:blipFill>
+          <a:blip r:embed="rId4"/>
+          <a:stretch>
+            <a:fillRect/>
+          </a:stretch>
+        </p:blipFill>
+        <p:spPr>
+          <a:xfrm>
+            <a:off x="9948418" y="-14960"/>
+            <a:ext cx="2265640" cy="1536606"/>
+          </a:xfrm>
+          <a:prstGeom prst="rect">
+            <a:avLst/>
+          </a:prstGeom>
+        </p:spPr>
+      </p:pic>
+      <p:pic>
+        <p:nvPicPr>
+          <p:cNvPr id="7" name="Kép 6">
+            <a:extLst>
+              <a:ext uri="{FF2B5EF4-FFF2-40B4-BE49-F238E27FC236}">
+                <a16:creationId xmlns:a16="http://schemas.microsoft.com/office/drawing/2014/main" id="{EF980ED3-D7B4-49B6-857E-9F4C7F2A34D1}"/>
+              </a:ext>
+            </a:extLst>
+          </p:cNvPr>
+          <p:cNvPicPr>
+            <a:picLocks noChangeAspect="1"/>
+          </p:cNvPicPr>
+          <p:nvPr/>
+        </p:nvPicPr>
+        <p:blipFill>
+          <a:blip r:embed="rId4"/>
+          <a:stretch>
+            <a:fillRect/>
+          </a:stretch>
+        </p:blipFill>
+        <p:spPr>
+          <a:xfrm>
+            <a:off x="151397" y="1452223"/>
+            <a:ext cx="1017565" cy="690134"/>
           </a:xfrm>
           <a:prstGeom prst="rect">
             <a:avLst/>
@@ -9004,7 +9534,7 @@
     </p:spTree>
     <p:extLst>
       <p:ext uri="{BB962C8B-B14F-4D97-AF65-F5344CB8AC3E}">
-        <p14:creationId xmlns:p14="http://schemas.microsoft.com/office/powerpoint/2010/main" val="2723453128"/>
+        <p14:creationId xmlns:p14="http://schemas.microsoft.com/office/powerpoint/2010/main" val="2986308909"/>
       </p:ext>
     </p:extLst>
   </p:cSld>
@@ -9092,25 +9622,18 @@
         </p:nvSpPr>
         <p:spPr>
           <a:xfrm>
-            <a:off x="7713628" y="1418304"/>
-            <a:ext cx="3329510" cy="581209"/>
+            <a:off x="7713628" y="1216081"/>
+            <a:ext cx="3092116" cy="581209"/>
           </a:xfrm>
         </p:spPr>
         <p:txBody>
-          <a:bodyPr>
-            <a:normAutofit fontScale="90000"/>
-          </a:bodyPr>
+          <a:bodyPr/>
           <a:lstStyle/>
           <a:p>
             <a:r>
-              <a:rPr lang="hu-HU" dirty="0" smtClean="0"/>
-              <a:t>Az eltávolítás</a:t>
+              <a:rPr lang="hu-HU" dirty="0"/>
+              <a:t>A keresés fül</a:t>
             </a:r>
-            <a:r>
-              <a:rPr lang="hu-HU" dirty="0" smtClean="0"/>
-              <a:t> fül</a:t>
-            </a:r>
-            <a:endParaRPr lang="hu-HU" dirty="0"/>
           </a:p>
         </p:txBody>
       </p:sp>
@@ -9137,16 +9660,15 @@
           <a:lstStyle/>
           <a:p>
             <a:r>
-              <a:rPr lang="hu-HU" sz="3200" dirty="0" smtClean="0"/>
-              <a:t>Itt távolíthatjuk el az adatbázisból a számunkra nem szükséges sorozatot.</a:t>
+              <a:rPr lang="hu-HU" sz="3200" dirty="0"/>
+              <a:t>Itt kereshetjük ki az adatbázisból a kívánt filmet.</a:t>
             </a:r>
-            <a:endParaRPr lang="hu-HU" sz="3200" dirty="0"/>
           </a:p>
         </p:txBody>
       </p:sp>
       <p:pic>
         <p:nvPicPr>
-          <p:cNvPr id="6" name="Kép 5"/>
+          <p:cNvPr id="2" name="Kép 1"/>
           <p:cNvPicPr>
             <a:picLocks noChangeAspect="1"/>
           </p:cNvPicPr>
@@ -9166,8 +9688,68 @@
         </p:blipFill>
         <p:spPr>
           <a:xfrm>
-            <a:off x="246185" y="1594614"/>
-            <a:ext cx="7060223" cy="3971376"/>
+            <a:off x="290147" y="1506686"/>
+            <a:ext cx="6989884" cy="3931810"/>
+          </a:xfrm>
+          <a:prstGeom prst="rect">
+            <a:avLst/>
+          </a:prstGeom>
+        </p:spPr>
+      </p:pic>
+      <p:pic>
+        <p:nvPicPr>
+          <p:cNvPr id="6" name="Kép 5">
+            <a:extLst>
+              <a:ext uri="{FF2B5EF4-FFF2-40B4-BE49-F238E27FC236}">
+                <a16:creationId xmlns:a16="http://schemas.microsoft.com/office/drawing/2014/main" id="{C8B0EF5C-463C-4900-BF0A-87E265632EEA}"/>
+              </a:ext>
+            </a:extLst>
+          </p:cNvPr>
+          <p:cNvPicPr>
+            <a:picLocks noChangeAspect="1"/>
+          </p:cNvPicPr>
+          <p:nvPr/>
+        </p:nvPicPr>
+        <p:blipFill>
+          <a:blip r:embed="rId4"/>
+          <a:stretch>
+            <a:fillRect/>
+          </a:stretch>
+        </p:blipFill>
+        <p:spPr>
+          <a:xfrm>
+            <a:off x="9948418" y="-14960"/>
+            <a:ext cx="2265640" cy="1536606"/>
+          </a:xfrm>
+          <a:prstGeom prst="rect">
+            <a:avLst/>
+          </a:prstGeom>
+        </p:spPr>
+      </p:pic>
+      <p:pic>
+        <p:nvPicPr>
+          <p:cNvPr id="7" name="Kép 6">
+            <a:extLst>
+              <a:ext uri="{FF2B5EF4-FFF2-40B4-BE49-F238E27FC236}">
+                <a16:creationId xmlns:a16="http://schemas.microsoft.com/office/drawing/2014/main" id="{DFAE922E-D0D0-4CA5-A4D0-F3E5BB8F1AB9}"/>
+              </a:ext>
+            </a:extLst>
+          </p:cNvPr>
+          <p:cNvPicPr>
+            <a:picLocks noChangeAspect="1"/>
+          </p:cNvPicPr>
+          <p:nvPr/>
+        </p:nvPicPr>
+        <p:blipFill>
+          <a:blip r:embed="rId4"/>
+          <a:stretch>
+            <a:fillRect/>
+          </a:stretch>
+        </p:blipFill>
+        <p:spPr>
+          <a:xfrm>
+            <a:off x="141872" y="1506685"/>
+            <a:ext cx="1017565" cy="690134"/>
           </a:xfrm>
           <a:prstGeom prst="rect">
             <a:avLst/>
@@ -9177,7 +9759,7 @@
     </p:spTree>
     <p:extLst>
       <p:ext uri="{BB962C8B-B14F-4D97-AF65-F5344CB8AC3E}">
-        <p14:creationId xmlns:p14="http://schemas.microsoft.com/office/powerpoint/2010/main" val="2771454996"/>
+        <p14:creationId xmlns:p14="http://schemas.microsoft.com/office/powerpoint/2010/main" val="3577813126"/>
       </p:ext>
     </p:extLst>
   </p:cSld>
@@ -9265,8 +9847,37 @@
         </p:nvSpPr>
         <p:spPr>
           <a:xfrm>
-            <a:off x="7595159" y="2479431"/>
-            <a:ext cx="4453311" cy="777383"/>
+            <a:off x="7713628" y="1216081"/>
+            <a:ext cx="3092116" cy="581209"/>
+          </a:xfrm>
+        </p:spPr>
+        <p:txBody>
+          <a:bodyPr>
+            <a:normAutofit fontScale="90000"/>
+          </a:bodyPr>
+          <a:lstStyle/>
+          <a:p>
+            <a:r>
+              <a:rPr lang="hu-HU" dirty="0"/>
+              <a:t>A hozzáadás fül</a:t>
+            </a:r>
+          </a:p>
+        </p:txBody>
+      </p:sp>
+      <p:sp>
+        <p:nvSpPr>
+          <p:cNvPr id="4" name="Szöveg helye 3"/>
+          <p:cNvSpPr>
+            <a:spLocks noGrp="1"/>
+          </p:cNvSpPr>
+          <p:nvPr>
+            <p:ph type="body" sz="half" idx="2"/>
+          </p:nvPr>
+        </p:nvSpPr>
+        <p:spPr>
+          <a:xfrm>
+            <a:off x="7713628" y="2295251"/>
+            <a:ext cx="3092117" cy="4164164"/>
           </a:xfrm>
         </p:spPr>
         <p:txBody>
@@ -9276,24 +9887,18 @@
           <a:lstStyle/>
           <a:p>
             <a:r>
-              <a:rPr lang="hu-HU" dirty="0" smtClean="0"/>
-              <a:t>Egy kis extra a </a:t>
+              <a:rPr lang="hu-HU" sz="3200" dirty="0"/>
+              <a:t>Itt adhatunk hozzá az adatbázisunkhoz új filmet.</a:t>
             </a:r>
-            <a:r>
-              <a:rPr lang="hu-HU" dirty="0" err="1" smtClean="0"/>
-              <a:t>light</a:t>
-            </a:r>
-            <a:r>
-              <a:rPr lang="hu-HU" dirty="0" smtClean="0"/>
-              <a:t> téma</a:t>
-            </a:r>
-            <a:endParaRPr lang="hu-HU" dirty="0"/>
+          </a:p>
+          <a:p>
+            <a:endParaRPr lang="hu-HU" sz="3200" dirty="0"/>
           </a:p>
         </p:txBody>
       </p:sp>
       <p:pic>
         <p:nvPicPr>
-          <p:cNvPr id="8" name="Kép 7"/>
+          <p:cNvPr id="6" name="Kép 5"/>
           <p:cNvPicPr>
             <a:picLocks noChangeAspect="1"/>
           </p:cNvPicPr>
@@ -9313,8 +9918,8 @@
         </p:blipFill>
         <p:spPr>
           <a:xfrm>
-            <a:off x="9927426" y="-29198"/>
-            <a:ext cx="2307624" cy="1565082"/>
+            <a:off x="272562" y="1608992"/>
+            <a:ext cx="6971324" cy="3921370"/>
           </a:xfrm>
           <a:prstGeom prst="rect">
             <a:avLst/>
@@ -9323,28 +9928,58 @@
       </p:pic>
       <p:pic>
         <p:nvPicPr>
-          <p:cNvPr id="2" name="Kép 1"/>
+          <p:cNvPr id="7" name="Kép 6">
+            <a:extLst>
+              <a:ext uri="{FF2B5EF4-FFF2-40B4-BE49-F238E27FC236}">
+                <a16:creationId xmlns:a16="http://schemas.microsoft.com/office/drawing/2014/main" id="{EBD7F6D0-4683-4DC0-8679-D99994E10760}"/>
+              </a:ext>
+            </a:extLst>
+          </p:cNvPr>
           <p:cNvPicPr>
             <a:picLocks noChangeAspect="1"/>
           </p:cNvPicPr>
           <p:nvPr/>
         </p:nvPicPr>
         <p:blipFill>
-          <a:blip r:embed="rId4">
-            <a:extLst>
-              <a:ext uri="{28A0092B-C50C-407E-A947-70E740481C1C}">
-                <a14:useLocalDpi xmlns:a14="http://schemas.microsoft.com/office/drawing/2010/main" val="0"/>
-              </a:ext>
-            </a:extLst>
-          </a:blip>
+          <a:blip r:embed="rId4"/>
           <a:stretch>
             <a:fillRect/>
           </a:stretch>
         </p:blipFill>
         <p:spPr>
           <a:xfrm>
-            <a:off x="289991" y="1708908"/>
-            <a:ext cx="6902117" cy="3882441"/>
+            <a:off x="9948418" y="-14960"/>
+            <a:ext cx="2265640" cy="1536606"/>
+          </a:xfrm>
+          <a:prstGeom prst="rect">
+            <a:avLst/>
+          </a:prstGeom>
+        </p:spPr>
+      </p:pic>
+      <p:pic>
+        <p:nvPicPr>
+          <p:cNvPr id="8" name="Kép 7">
+            <a:extLst>
+              <a:ext uri="{FF2B5EF4-FFF2-40B4-BE49-F238E27FC236}">
+                <a16:creationId xmlns:a16="http://schemas.microsoft.com/office/drawing/2014/main" id="{4677A221-BA4F-436D-9261-1E78070AB9C5}"/>
+              </a:ext>
+            </a:extLst>
+          </p:cNvPr>
+          <p:cNvPicPr>
+            <a:picLocks noChangeAspect="1"/>
+          </p:cNvPicPr>
+          <p:nvPr/>
+        </p:nvPicPr>
+        <p:blipFill>
+          <a:blip r:embed="rId4"/>
+          <a:stretch>
+            <a:fillRect/>
+          </a:stretch>
+        </p:blipFill>
+        <p:spPr>
+          <a:xfrm>
+            <a:off x="132347" y="1605117"/>
+            <a:ext cx="1017565" cy="690134"/>
           </a:xfrm>
           <a:prstGeom prst="rect">
             <a:avLst/>
@@ -9354,7 +9989,7 @@
     </p:spTree>
     <p:extLst>
       <p:ext uri="{BB962C8B-B14F-4D97-AF65-F5344CB8AC3E}">
-        <p14:creationId xmlns:p14="http://schemas.microsoft.com/office/powerpoint/2010/main" val="2771765645"/>
+        <p14:creationId xmlns:p14="http://schemas.microsoft.com/office/powerpoint/2010/main" val="2723453128"/>
       </p:ext>
     </p:extLst>
   </p:cSld>
@@ -9400,69 +10035,201 @@
           <a:chExt cx="0" cy="0"/>
         </a:xfrm>
       </p:grpSpPr>
+      <p:pic>
+        <p:nvPicPr>
+          <p:cNvPr id="5" name="Kép 4"/>
+          <p:cNvPicPr>
+            <a:picLocks noChangeAspect="1"/>
+          </p:cNvPicPr>
+          <p:nvPr/>
+        </p:nvPicPr>
+        <p:blipFill>
+          <a:blip r:embed="rId2">
+            <a:extLst>
+              <a:ext uri="{28A0092B-C50C-407E-A947-70E740481C1C}">
+                <a14:useLocalDpi xmlns:a14="http://schemas.microsoft.com/office/drawing/2010/main" val="0"/>
+              </a:ext>
+            </a:extLst>
+          </a:blip>
+          <a:stretch>
+            <a:fillRect/>
+          </a:stretch>
+        </p:blipFill>
+        <p:spPr>
+          <a:xfrm>
+            <a:off x="9970476" y="0"/>
+            <a:ext cx="2221524" cy="1506686"/>
+          </a:xfrm>
+          <a:prstGeom prst="rect">
+            <a:avLst/>
+          </a:prstGeom>
+        </p:spPr>
+      </p:pic>
       <p:sp>
         <p:nvSpPr>
-          <p:cNvPr id="2" name="Cím 1"/>
+          <p:cNvPr id="3" name="Cím 2"/>
           <p:cNvSpPr>
             <a:spLocks noGrp="1"/>
           </p:cNvSpPr>
           <p:nvPr>
-            <p:ph type="ctrTitle"/>
+            <p:ph type="title"/>
           </p:nvPr>
         </p:nvSpPr>
-        <p:spPr/>
+        <p:spPr>
+          <a:xfrm>
+            <a:off x="7713628" y="1418304"/>
+            <a:ext cx="3329510" cy="581209"/>
+          </a:xfrm>
+        </p:spPr>
         <p:txBody>
-          <a:bodyPr/>
+          <a:bodyPr>
+            <a:normAutofit fontScale="90000"/>
+          </a:bodyPr>
           <a:lstStyle/>
           <a:p>
             <a:r>
-              <a:rPr lang="hu-HU" dirty="0" smtClean="0"/>
-              <a:t>Köszönöm a figyelmet</a:t>
+              <a:rPr lang="hu-HU" dirty="0"/>
+              <a:t>Az eltávolítás fül</a:t>
             </a:r>
-            <a:endParaRPr lang="hu-HU" dirty="0"/>
           </a:p>
         </p:txBody>
       </p:sp>
       <p:sp>
         <p:nvSpPr>
-          <p:cNvPr id="3" name="Alcím 2"/>
+          <p:cNvPr id="4" name="Szöveg helye 3"/>
           <p:cNvSpPr>
             <a:spLocks noGrp="1"/>
           </p:cNvSpPr>
           <p:nvPr>
-            <p:ph type="subTitle" idx="1"/>
+            <p:ph type="body" sz="half" idx="2"/>
           </p:nvPr>
         </p:nvSpPr>
-        <p:spPr/>
+        <p:spPr>
+          <a:xfrm>
+            <a:off x="7713628" y="2295251"/>
+            <a:ext cx="3092117" cy="4164164"/>
+          </a:xfrm>
+        </p:spPr>
         <p:txBody>
-          <a:bodyPr/>
+          <a:bodyPr>
+            <a:normAutofit/>
+          </a:bodyPr>
           <a:lstStyle/>
           <a:p>
             <a:r>
-              <a:rPr lang="hu-HU" dirty="0" smtClean="0"/>
-              <a:t>A sori legyen veletek</a:t>
+              <a:rPr lang="hu-HU" sz="3200" dirty="0"/>
+              <a:t>Itt távolíthatjuk el az adatbázisból a számunkra nem szükséges filmet.</a:t>
             </a:r>
-            <a:endParaRPr lang="hu-HU" dirty="0"/>
           </a:p>
         </p:txBody>
       </p:sp>
+      <p:pic>
+        <p:nvPicPr>
+          <p:cNvPr id="6" name="Kép 5"/>
+          <p:cNvPicPr>
+            <a:picLocks noChangeAspect="1"/>
+          </p:cNvPicPr>
+          <p:nvPr/>
+        </p:nvPicPr>
+        <p:blipFill>
+          <a:blip r:embed="rId3">
+            <a:extLst>
+              <a:ext uri="{28A0092B-C50C-407E-A947-70E740481C1C}">
+                <a14:useLocalDpi xmlns:a14="http://schemas.microsoft.com/office/drawing/2010/main" val="0"/>
+              </a:ext>
+            </a:extLst>
+          </a:blip>
+          <a:stretch>
+            <a:fillRect/>
+          </a:stretch>
+        </p:blipFill>
+        <p:spPr>
+          <a:xfrm>
+            <a:off x="246185" y="1594614"/>
+            <a:ext cx="7060223" cy="3971376"/>
+          </a:xfrm>
+          <a:prstGeom prst="rect">
+            <a:avLst/>
+          </a:prstGeom>
+        </p:spPr>
+      </p:pic>
+      <p:pic>
+        <p:nvPicPr>
+          <p:cNvPr id="7" name="Kép 6">
+            <a:extLst>
+              <a:ext uri="{FF2B5EF4-FFF2-40B4-BE49-F238E27FC236}">
+                <a16:creationId xmlns:a16="http://schemas.microsoft.com/office/drawing/2014/main" id="{21571B47-DBEB-4BDA-B9A9-F2BAAA4837DE}"/>
+              </a:ext>
+            </a:extLst>
+          </p:cNvPr>
+          <p:cNvPicPr>
+            <a:picLocks noChangeAspect="1"/>
+          </p:cNvPicPr>
+          <p:nvPr/>
+        </p:nvPicPr>
+        <p:blipFill>
+          <a:blip r:embed="rId4"/>
+          <a:stretch>
+            <a:fillRect/>
+          </a:stretch>
+        </p:blipFill>
+        <p:spPr>
+          <a:xfrm>
+            <a:off x="9948418" y="-14960"/>
+            <a:ext cx="2265640" cy="1536606"/>
+          </a:xfrm>
+          <a:prstGeom prst="rect">
+            <a:avLst/>
+          </a:prstGeom>
+        </p:spPr>
+      </p:pic>
+      <p:pic>
+        <p:nvPicPr>
+          <p:cNvPr id="8" name="Kép 7">
+            <a:extLst>
+              <a:ext uri="{FF2B5EF4-FFF2-40B4-BE49-F238E27FC236}">
+                <a16:creationId xmlns:a16="http://schemas.microsoft.com/office/drawing/2014/main" id="{AA330F81-E35C-4FC9-B466-A07343644FA7}"/>
+              </a:ext>
+            </a:extLst>
+          </p:cNvPr>
+          <p:cNvPicPr>
+            <a:picLocks noChangeAspect="1"/>
+          </p:cNvPicPr>
+          <p:nvPr/>
+        </p:nvPicPr>
+        <p:blipFill>
+          <a:blip r:embed="rId4"/>
+          <a:stretch>
+            <a:fillRect/>
+          </a:stretch>
+        </p:blipFill>
+        <p:spPr>
+          <a:xfrm>
+            <a:off x="59024" y="1532702"/>
+            <a:ext cx="1140638" cy="773605"/>
+          </a:xfrm>
+          <a:prstGeom prst="rect">
+            <a:avLst/>
+          </a:prstGeom>
+        </p:spPr>
+      </p:pic>
     </p:spTree>
     <p:extLst>
       <p:ext uri="{BB962C8B-B14F-4D97-AF65-F5344CB8AC3E}">
-        <p14:creationId xmlns:p14="http://schemas.microsoft.com/office/powerpoint/2010/main" val="3241144433"/>
+        <p14:creationId xmlns:p14="http://schemas.microsoft.com/office/powerpoint/2010/main" val="2771454996"/>
       </p:ext>
     </p:extLst>
   </p:cSld>
   <p:clrMapOvr>
     <a:masterClrMapping/>
   </p:clrMapOvr>
-  <mc:AlternateContent xmlns:mc="http://schemas.openxmlformats.org/markup-compatibility/2006">
-    <mc:Choice xmlns:p14="http://schemas.microsoft.com/office/powerpoint/2010/main" Requires="p14">
+  <mc:AlternateContent xmlns:mc="http://schemas.openxmlformats.org/markup-compatibility/2006" xmlns:p14="http://schemas.microsoft.com/office/powerpoint/2010/main">
+    <mc:Choice Requires="p14">
       <p:transition spd="slow" p14:dur="4000">
         <p14:vortex dir="r"/>
       </p:transition>
     </mc:Choice>
-    <mc:Fallback>
+    <mc:Fallback xmlns="">
       <p:transition spd="slow">
         <p:fade/>
       </p:transition>

</xml_diff>